<commit_message>
Update lecture slides and add function demo code
Lecture slides for C++ basics, flow control, loops, arrays, and functions have been updated. The PDF for Lecture 05 was replaced with a PPTX version. Added multiple C++ demo files in Lec-08 illustrating function usage, overloading, references, and global variables.
</commit_message>
<xml_diff>
--- a/Lec-08/Lectures 8 - Functions .pptx
+++ b/Lec-08/Lectures 8 - Functions .pptx
@@ -301,7 +301,7 @@
           <a:p>
             <a:fld id="{FC7C4E2E-64C6-46E6-9EEF-ED611B6593D1}" type="datetime1">
               <a:rPr lang="en-US" smtClean="0"/>
-              <a:t>11/26/2025</a:t>
+              <a:t>11/27/2025</a:t>
             </a:fld>
             <a:endParaRPr lang="en-US" dirty="0"/>
           </a:p>
@@ -483,7 +483,7 @@
           <a:p>
             <a:fld id="{5E2890AD-4ACA-408F-94CA-F364FF72F1B8}" type="datetime1">
               <a:rPr lang="en-US" smtClean="0"/>
-              <a:t>11/26/2025</a:t>
+              <a:t>11/27/2025</a:t>
             </a:fld>
             <a:endParaRPr lang="en-US" dirty="0"/>
           </a:p>
@@ -47681,24 +47681,6 @@
 </file>
 
 <file path=customXml/item1.xml><?xml version="1.0" encoding="utf-8"?>
-<?mso-contentType ?>
-<FormTemplates xmlns="http://schemas.microsoft.com/sharepoint/v3/contenttype/forms">
-  <Display>DocumentLibraryForm</Display>
-  <Edit>DocumentLibraryForm</Edit>
-  <New>DocumentLibraryForm</New>
-</FormTemplates>
-</file>
-
-<file path=customXml/item2.xml><?xml version="1.0" encoding="utf-8"?>
-<p:properties xmlns:p="http://schemas.microsoft.com/office/2006/metadata/properties" xmlns:xsi="http://www.w3.org/2001/XMLSchema-instance" xmlns:pc="http://schemas.microsoft.com/office/infopath/2007/PartnerControls">
-  <documentManagement>
-    <MediaServiceKeyPoints xmlns="71af3243-3dd4-4a8d-8c0d-dd76da1f02a5" xsi:nil="true"/>
-    <Status xmlns="71af3243-3dd4-4a8d-8c0d-dd76da1f02a5">Not started</Status>
-  </documentManagement>
-</p:properties>
-</file>
-
-<file path=customXml/item3.xml><?xml version="1.0" encoding="utf-8"?>
 <ct:contentTypeSchema xmlns:ct="http://schemas.microsoft.com/office/2006/metadata/contentType" xmlns:ma="http://schemas.microsoft.com/office/2006/metadata/properties/metaAttributes" ct:_="" ma:_="" ma:contentTypeName="Document" ma:contentTypeID="0x01010079F111ED35F8CC479449609E8A0923A6" ma:contentTypeVersion="12" ma:contentTypeDescription="Create a new document." ma:contentTypeScope="" ma:versionID="b385d60f68dd989dca1fdc827799d853">
   <xsd:schema xmlns:xsd="http://www.w3.org/2001/XMLSchema" xmlns:xs="http://www.w3.org/2001/XMLSchema" xmlns:p="http://schemas.microsoft.com/office/2006/metadata/properties" xmlns:ns2="71af3243-3dd4-4a8d-8c0d-dd76da1f02a5" xmlns:ns3="16c05727-aa75-4e4a-9b5f-8a80a1165891" targetNamespace="http://schemas.microsoft.com/office/2006/metadata/properties" ma:root="true" ma:fieldsID="1911b479caf7b199da365455750e4572" ns2:_="" ns3:_="">
     <xsd:import namespace="71af3243-3dd4-4a8d-8c0d-dd76da1f02a5"/>
@@ -47919,10 +47901,39 @@
 </ct:contentTypeSchema>
 </file>
 
+<file path=customXml/item2.xml><?xml version="1.0" encoding="utf-8"?>
+<p:properties xmlns:p="http://schemas.microsoft.com/office/2006/metadata/properties" xmlns:xsi="http://www.w3.org/2001/XMLSchema-instance" xmlns:pc="http://schemas.microsoft.com/office/infopath/2007/PartnerControls">
+  <documentManagement>
+    <MediaServiceKeyPoints xmlns="71af3243-3dd4-4a8d-8c0d-dd76da1f02a5" xsi:nil="true"/>
+    <Status xmlns="71af3243-3dd4-4a8d-8c0d-dd76da1f02a5">Not started</Status>
+  </documentManagement>
+</p:properties>
+</file>
+
+<file path=customXml/item3.xml><?xml version="1.0" encoding="utf-8"?>
+<?mso-contentType ?>
+<FormTemplates xmlns="http://schemas.microsoft.com/sharepoint/v3/contenttype/forms">
+  <Display>DocumentLibraryForm</Display>
+  <Edit>DocumentLibraryForm</Edit>
+  <New>DocumentLibraryForm</New>
+</FormTemplates>
+</file>
+
 <file path=customXml/itemProps1.xml><?xml version="1.0" encoding="utf-8"?>
-<ds:datastoreItem xmlns:ds="http://schemas.openxmlformats.org/officeDocument/2006/customXml" ds:itemID="{E3FC8A1C-A436-42C0-AC33-FAFFFAF219BC}">
+<ds:datastoreItem xmlns:ds="http://schemas.openxmlformats.org/officeDocument/2006/customXml" ds:itemID="{E3852F5D-AAE7-473B-9767-8875B60BC63B}">
   <ds:schemaRefs>
-    <ds:schemaRef ds:uri="http://schemas.microsoft.com/sharepoint/v3/contenttype/forms"/>
+    <ds:schemaRef ds:uri="http://schemas.microsoft.com/office/2006/metadata/contentType"/>
+    <ds:schemaRef ds:uri="http://schemas.microsoft.com/office/2006/metadata/properties/metaAttributes"/>
+    <ds:schemaRef ds:uri="http://www.w3.org/2001/XMLSchema"/>
+    <ds:schemaRef ds:uri="http://schemas.microsoft.com/office/2006/metadata/properties"/>
+    <ds:schemaRef ds:uri="71af3243-3dd4-4a8d-8c0d-dd76da1f02a5"/>
+    <ds:schemaRef ds:uri="16c05727-aa75-4e4a-9b5f-8a80a1165891"/>
+    <ds:schemaRef ds:uri="http://schemas.microsoft.com/office/2006/documentManagement/types"/>
+    <ds:schemaRef ds:uri="http://schemas.microsoft.com/office/infopath/2007/PartnerControls"/>
+    <ds:schemaRef ds:uri="http://schemas.openxmlformats.org/package/2006/metadata/core-properties"/>
+    <ds:schemaRef ds:uri="http://purl.org/dc/elements/1.1/"/>
+    <ds:schemaRef ds:uri="http://purl.org/dc/terms/"/>
+    <ds:schemaRef ds:uri="http://schemas.microsoft.com/internal/obd"/>
   </ds:schemaRefs>
 </ds:datastoreItem>
 </file>
@@ -47945,20 +47956,9 @@
 </file>
 
 <file path=customXml/itemProps3.xml><?xml version="1.0" encoding="utf-8"?>
-<ds:datastoreItem xmlns:ds="http://schemas.openxmlformats.org/officeDocument/2006/customXml" ds:itemID="{E3852F5D-AAE7-473B-9767-8875B60BC63B}">
+<ds:datastoreItem xmlns:ds="http://schemas.openxmlformats.org/officeDocument/2006/customXml" ds:itemID="{E3FC8A1C-A436-42C0-AC33-FAFFFAF219BC}">
   <ds:schemaRefs>
-    <ds:schemaRef ds:uri="http://schemas.microsoft.com/office/2006/metadata/contentType"/>
-    <ds:schemaRef ds:uri="http://schemas.microsoft.com/office/2006/metadata/properties/metaAttributes"/>
-    <ds:schemaRef ds:uri="http://www.w3.org/2001/XMLSchema"/>
-    <ds:schemaRef ds:uri="http://schemas.microsoft.com/office/2006/metadata/properties"/>
-    <ds:schemaRef ds:uri="71af3243-3dd4-4a8d-8c0d-dd76da1f02a5"/>
-    <ds:schemaRef ds:uri="16c05727-aa75-4e4a-9b5f-8a80a1165891"/>
-    <ds:schemaRef ds:uri="http://schemas.microsoft.com/office/2006/documentManagement/types"/>
-    <ds:schemaRef ds:uri="http://schemas.microsoft.com/office/infopath/2007/PartnerControls"/>
-    <ds:schemaRef ds:uri="http://schemas.openxmlformats.org/package/2006/metadata/core-properties"/>
-    <ds:schemaRef ds:uri="http://purl.org/dc/elements/1.1/"/>
-    <ds:schemaRef ds:uri="http://purl.org/dc/terms/"/>
-    <ds:schemaRef ds:uri="http://schemas.microsoft.com/internal/obd"/>
+    <ds:schemaRef ds:uri="http://schemas.microsoft.com/sharepoint/v3/contenttype/forms"/>
   </ds:schemaRefs>
 </ds:datastoreItem>
 </file>
</xml_diff>